<commit_message>
- Had the wrong version of the profile presentation - Small correction to definition of value[x] in profile, as discussed with Lloyd
git-svn-id: http://gforge.hl7.org/svn/fhir/trunk@2144 2f0db536-2c49-4257-a3fa-e771ed206c19
</commit_message>
<xml_diff>
--- a/presentations/2014-01 Tutorials/201401 - San Antonio - Profiling FHIR.pptx
+++ b/presentations/2014-01 Tutorials/201401 - San Antonio - Profiling FHIR.pptx
@@ -233,7 +233,7 @@
           <a:p>
             <a:fld id="{10B9A41D-2C14-4FD9-A8FE-469DBFAB3809}" type="datetimeFigureOut">
               <a:rPr lang="en-CA" smtClean="0"/>
-              <a:t>2014-01-12</a:t>
+              <a:t>2014-01-14</a:t>
             </a:fld>
             <a:endParaRPr lang="en-CA" dirty="0"/>
           </a:p>
@@ -7988,7 +7988,7 @@
           <a:p>
             <a:fld id="{8FCA521A-5C8A-4933-9234-1A0DD0C7D7AC}" type="datetime1">
               <a:rPr lang="en-US" smtClean="0"/>
-              <a:t>1/12/2014</a:t>
+              <a:t>1/14/2014</a:t>
             </a:fld>
             <a:endParaRPr lang="en-US"/>
           </a:p>
@@ -11286,11 +11286,7 @@
             <a:pPr lvl="2"/>
             <a:r>
               <a:rPr lang="en-US" dirty="0" smtClean="0"/>
-              <a:t>Allow additional codes, </a:t>
-            </a:r>
-            <a:r>
-              <a:rPr lang="en-US" dirty="0" smtClean="0"/>
-              <a:t>Restrict to a subset</a:t>
+              <a:t>Allow additional codes, Restrict to a subset</a:t>
             </a:r>
           </a:p>
           <a:p>
@@ -12598,7 +12594,6 @@
               <a:rPr lang="en-US" sz="3200" b="1" dirty="0" smtClean="0"/>
               <a:t>”</a:t>
             </a:r>
-            <a:endParaRPr lang="en-US" sz="3200" b="1" dirty="0" smtClean="0"/>
           </a:p>
           <a:p>
             <a:r>
@@ -14225,16 +14220,6 @@
               </a:rPr>
               <a:t>Observation</a:t>
             </a:r>
-            <a:endParaRPr kumimoji="0" lang="en-US" sz="1800" b="1" i="0" u="none" strike="noStrike" cap="none" normalizeH="0" baseline="0" dirty="0" smtClean="0">
-              <a:ln>
-                <a:noFill/>
-              </a:ln>
-              <a:solidFill>
-                <a:schemeClr val="tx1"/>
-              </a:solidFill>
-              <a:effectLst/>
-              <a:latin typeface="Arial" charset="0"/>
-            </a:endParaRPr>
           </a:p>
           <a:p>
             <a:pPr marL="0" marR="0" indent="0" algn="l" defTabSz="914400" rtl="0" eaLnBrk="0" fontAlgn="base" latinLnBrk="0" hangingPunct="0">
@@ -14328,16 +14313,6 @@
               </a:rPr>
               <a:t>Patient</a:t>
             </a:r>
-            <a:endParaRPr kumimoji="0" lang="en-US" sz="1800" b="1" i="0" u="none" strike="noStrike" cap="none" normalizeH="0" baseline="0" dirty="0" smtClean="0">
-              <a:ln>
-                <a:noFill/>
-              </a:ln>
-              <a:solidFill>
-                <a:schemeClr val="tx1"/>
-              </a:solidFill>
-              <a:effectLst/>
-              <a:latin typeface="Arial" charset="0"/>
-            </a:endParaRPr>
           </a:p>
           <a:p>
             <a:pPr marL="0" marR="0" indent="0" algn="l" defTabSz="914400" rtl="0" eaLnBrk="0" fontAlgn="base" latinLnBrk="0" hangingPunct="0">
@@ -14431,16 +14406,6 @@
               </a:rPr>
               <a:t>Organization</a:t>
             </a:r>
-            <a:endParaRPr kumimoji="0" lang="en-US" sz="1800" b="1" i="0" u="none" strike="noStrike" cap="none" normalizeH="0" baseline="0" dirty="0" smtClean="0">
-              <a:ln>
-                <a:noFill/>
-              </a:ln>
-              <a:solidFill>
-                <a:schemeClr val="tx1"/>
-              </a:solidFill>
-              <a:effectLst/>
-              <a:latin typeface="Arial" charset="0"/>
-            </a:endParaRPr>
           </a:p>
           <a:p>
             <a:pPr marL="0" marR="0" indent="0" algn="l" defTabSz="914400" rtl="0" eaLnBrk="0" fontAlgn="base" latinLnBrk="0" hangingPunct="0">
@@ -14534,16 +14499,6 @@
               </a:rPr>
               <a:t>Location</a:t>
             </a:r>
-            <a:endParaRPr kumimoji="0" lang="en-US" sz="1800" b="1" i="0" u="none" strike="noStrike" cap="none" normalizeH="0" baseline="0" dirty="0" smtClean="0">
-              <a:ln>
-                <a:noFill/>
-              </a:ln>
-              <a:solidFill>
-                <a:schemeClr val="tx1"/>
-              </a:solidFill>
-              <a:effectLst/>
-              <a:latin typeface="Arial" charset="0"/>
-            </a:endParaRPr>
           </a:p>
           <a:p>
             <a:pPr marL="0" marR="0" indent="0" algn="l" defTabSz="914400" rtl="0" eaLnBrk="0" fontAlgn="base" latinLnBrk="0" hangingPunct="0">
@@ -14637,16 +14592,6 @@
               </a:rPr>
               <a:t>Practitioner</a:t>
             </a:r>
-            <a:endParaRPr kumimoji="0" lang="en-US" sz="1800" b="1" i="0" u="none" strike="noStrike" cap="none" normalizeH="0" baseline="0" dirty="0" smtClean="0">
-              <a:ln>
-                <a:noFill/>
-              </a:ln>
-              <a:solidFill>
-                <a:schemeClr val="tx1"/>
-              </a:solidFill>
-              <a:effectLst/>
-              <a:latin typeface="Arial" charset="0"/>
-            </a:endParaRPr>
           </a:p>
           <a:p>
             <a:pPr marL="0" marR="0" indent="0" algn="l" defTabSz="914400" rtl="0" eaLnBrk="0" fontAlgn="base" latinLnBrk="0" hangingPunct="0">
@@ -14843,16 +14788,6 @@
               </a:rPr>
               <a:t>Observation</a:t>
             </a:r>
-            <a:endParaRPr kumimoji="0" lang="en-US" sz="1800" b="1" i="0" u="none" strike="noStrike" cap="none" normalizeH="0" baseline="0" dirty="0" smtClean="0">
-              <a:ln>
-                <a:noFill/>
-              </a:ln>
-              <a:solidFill>
-                <a:schemeClr val="tx1"/>
-              </a:solidFill>
-              <a:effectLst/>
-              <a:latin typeface="Arial" charset="0"/>
-            </a:endParaRPr>
           </a:p>
           <a:p>
             <a:pPr marL="0" marR="0" indent="0" algn="l" defTabSz="914400" rtl="0" eaLnBrk="0" fontAlgn="base" latinLnBrk="0" hangingPunct="0">
@@ -14946,16 +14881,6 @@
               </a:rPr>
               <a:t>Observation</a:t>
             </a:r>
-            <a:endParaRPr kumimoji="0" lang="en-US" sz="1800" b="1" i="0" u="none" strike="noStrike" cap="none" normalizeH="0" baseline="0" dirty="0" smtClean="0">
-              <a:ln>
-                <a:noFill/>
-              </a:ln>
-              <a:solidFill>
-                <a:schemeClr val="tx1"/>
-              </a:solidFill>
-              <a:effectLst/>
-              <a:latin typeface="Arial" charset="0"/>
-            </a:endParaRPr>
           </a:p>
           <a:p>
             <a:pPr marL="0" marR="0" indent="0" algn="l" defTabSz="914400" rtl="0" eaLnBrk="0" fontAlgn="base" latinLnBrk="0" hangingPunct="0">
@@ -15049,16 +14974,6 @@
               </a:rPr>
               <a:t>Practitioner</a:t>
             </a:r>
-            <a:endParaRPr kumimoji="0" lang="en-US" sz="1800" b="1" i="0" u="none" strike="noStrike" cap="none" normalizeH="0" baseline="0" dirty="0" smtClean="0">
-              <a:ln>
-                <a:noFill/>
-              </a:ln>
-              <a:solidFill>
-                <a:schemeClr val="tx1"/>
-              </a:solidFill>
-              <a:effectLst/>
-              <a:latin typeface="Arial" charset="0"/>
-            </a:endParaRPr>
           </a:p>
           <a:p>
             <a:pPr marL="0" marR="0" indent="0" algn="l" defTabSz="914400" rtl="0" eaLnBrk="0" fontAlgn="base" latinLnBrk="0" hangingPunct="0">
@@ -15410,16 +15325,6 @@
               </a:rPr>
               <a:t>Device</a:t>
             </a:r>
-            <a:endParaRPr kumimoji="0" lang="en-US" sz="1800" b="1" i="0" u="none" strike="noStrike" cap="none" normalizeH="0" baseline="0" dirty="0" smtClean="0">
-              <a:ln>
-                <a:noFill/>
-              </a:ln>
-              <a:solidFill>
-                <a:schemeClr val="tx1"/>
-              </a:solidFill>
-              <a:effectLst/>
-              <a:latin typeface="Arial" charset="0"/>
-            </a:endParaRPr>
           </a:p>
           <a:p>
             <a:pPr marL="0" marR="0" indent="0" algn="l" defTabSz="914400" rtl="0" eaLnBrk="0" fontAlgn="base" latinLnBrk="0" hangingPunct="0">
@@ -15633,16 +15538,6 @@
               </a:rPr>
               <a:t>Observation</a:t>
             </a:r>
-            <a:endParaRPr kumimoji="0" lang="en-US" sz="1800" b="1" i="0" u="none" strike="noStrike" cap="none" normalizeH="0" baseline="0" dirty="0" smtClean="0">
-              <a:ln>
-                <a:noFill/>
-              </a:ln>
-              <a:solidFill>
-                <a:schemeClr val="tx1"/>
-              </a:solidFill>
-              <a:effectLst/>
-              <a:latin typeface="Arial" charset="0"/>
-            </a:endParaRPr>
           </a:p>
           <a:p>
             <a:pPr marL="0" marR="0" indent="0" algn="l" defTabSz="914400" rtl="0" eaLnBrk="0" fontAlgn="base" latinLnBrk="0" hangingPunct="0">
@@ -15736,16 +15631,6 @@
               </a:rPr>
               <a:t>Patient</a:t>
             </a:r>
-            <a:endParaRPr kumimoji="0" lang="en-US" sz="1800" b="1" i="0" u="none" strike="noStrike" cap="none" normalizeH="0" baseline="0" dirty="0" smtClean="0">
-              <a:ln>
-                <a:noFill/>
-              </a:ln>
-              <a:solidFill>
-                <a:schemeClr val="tx1"/>
-              </a:solidFill>
-              <a:effectLst/>
-              <a:latin typeface="Arial" charset="0"/>
-            </a:endParaRPr>
           </a:p>
           <a:p>
             <a:pPr marL="0" marR="0" indent="0" algn="l" defTabSz="914400" rtl="0" eaLnBrk="0" fontAlgn="base" latinLnBrk="0" hangingPunct="0">
@@ -15839,16 +15724,6 @@
               </a:rPr>
               <a:t>Organization</a:t>
             </a:r>
-            <a:endParaRPr kumimoji="0" lang="en-US" sz="1800" b="1" i="0" u="none" strike="noStrike" cap="none" normalizeH="0" baseline="0" dirty="0" smtClean="0">
-              <a:ln>
-                <a:noFill/>
-              </a:ln>
-              <a:solidFill>
-                <a:schemeClr val="tx1"/>
-              </a:solidFill>
-              <a:effectLst/>
-              <a:latin typeface="Arial" charset="0"/>
-            </a:endParaRPr>
           </a:p>
           <a:p>
             <a:pPr marL="0" marR="0" indent="0" algn="l" defTabSz="914400" rtl="0" eaLnBrk="0" fontAlgn="base" latinLnBrk="0" hangingPunct="0">
@@ -15942,16 +15817,6 @@
               </a:rPr>
               <a:t>Location</a:t>
             </a:r>
-            <a:endParaRPr kumimoji="0" lang="en-US" sz="1800" b="1" i="0" u="none" strike="noStrike" cap="none" normalizeH="0" baseline="0" dirty="0" smtClean="0">
-              <a:ln>
-                <a:noFill/>
-              </a:ln>
-              <a:solidFill>
-                <a:schemeClr val="tx1"/>
-              </a:solidFill>
-              <a:effectLst/>
-              <a:latin typeface="Arial" charset="0"/>
-            </a:endParaRPr>
           </a:p>
           <a:p>
             <a:pPr marL="0" marR="0" indent="0" algn="l" defTabSz="914400" rtl="0" eaLnBrk="0" fontAlgn="base" latinLnBrk="0" hangingPunct="0">
@@ -16045,16 +15910,6 @@
               </a:rPr>
               <a:t>Practitioner</a:t>
             </a:r>
-            <a:endParaRPr kumimoji="0" lang="en-US" sz="1800" b="1" i="0" u="none" strike="noStrike" cap="none" normalizeH="0" baseline="0" dirty="0" smtClean="0">
-              <a:ln>
-                <a:noFill/>
-              </a:ln>
-              <a:solidFill>
-                <a:schemeClr val="tx1"/>
-              </a:solidFill>
-              <a:effectLst/>
-              <a:latin typeface="Arial" charset="0"/>
-            </a:endParaRPr>
           </a:p>
           <a:p>
             <a:pPr marL="0" marR="0" indent="0" algn="l" defTabSz="914400" rtl="0" eaLnBrk="0" fontAlgn="base" latinLnBrk="0" hangingPunct="0">
@@ -16251,16 +16106,6 @@
               </a:rPr>
               <a:t>Observation</a:t>
             </a:r>
-            <a:endParaRPr kumimoji="0" lang="en-US" sz="1800" b="1" i="0" u="none" strike="noStrike" cap="none" normalizeH="0" baseline="0" dirty="0" smtClean="0">
-              <a:ln>
-                <a:noFill/>
-              </a:ln>
-              <a:solidFill>
-                <a:schemeClr val="tx1"/>
-              </a:solidFill>
-              <a:effectLst/>
-              <a:latin typeface="Arial" charset="0"/>
-            </a:endParaRPr>
           </a:p>
           <a:p>
             <a:pPr marL="0" marR="0" indent="0" algn="l" defTabSz="914400" rtl="0" eaLnBrk="0" fontAlgn="base" latinLnBrk="0" hangingPunct="0">
@@ -16354,16 +16199,6 @@
               </a:rPr>
               <a:t>Observation</a:t>
             </a:r>
-            <a:endParaRPr kumimoji="0" lang="en-US" sz="1800" b="1" i="0" u="none" strike="noStrike" cap="none" normalizeH="0" baseline="0" dirty="0" smtClean="0">
-              <a:ln>
-                <a:noFill/>
-              </a:ln>
-              <a:solidFill>
-                <a:schemeClr val="tx1"/>
-              </a:solidFill>
-              <a:effectLst/>
-              <a:latin typeface="Arial" charset="0"/>
-            </a:endParaRPr>
           </a:p>
           <a:p>
             <a:pPr marL="0" marR="0" indent="0" algn="l" defTabSz="914400" rtl="0" eaLnBrk="0" fontAlgn="base" latinLnBrk="0" hangingPunct="0">
@@ -16457,16 +16292,6 @@
               </a:rPr>
               <a:t>Practitioner</a:t>
             </a:r>
-            <a:endParaRPr kumimoji="0" lang="en-US" sz="1800" b="1" i="0" u="none" strike="noStrike" cap="none" normalizeH="0" baseline="0" dirty="0" smtClean="0">
-              <a:ln>
-                <a:noFill/>
-              </a:ln>
-              <a:solidFill>
-                <a:schemeClr val="tx1"/>
-              </a:solidFill>
-              <a:effectLst/>
-              <a:latin typeface="Arial" charset="0"/>
-            </a:endParaRPr>
           </a:p>
           <a:p>
             <a:pPr marL="0" marR="0" indent="0" algn="l" defTabSz="914400" rtl="0" eaLnBrk="0" fontAlgn="base" latinLnBrk="0" hangingPunct="0">
@@ -16818,16 +16643,6 @@
               </a:rPr>
               <a:t>Device</a:t>
             </a:r>
-            <a:endParaRPr kumimoji="0" lang="en-US" sz="1800" b="1" i="0" u="none" strike="noStrike" cap="none" normalizeH="0" baseline="0" dirty="0" smtClean="0">
-              <a:ln>
-                <a:noFill/>
-              </a:ln>
-              <a:solidFill>
-                <a:schemeClr val="tx1"/>
-              </a:solidFill>
-              <a:effectLst/>
-              <a:latin typeface="Arial" charset="0"/>
-            </a:endParaRPr>
           </a:p>
           <a:p>
             <a:pPr marL="0" marR="0" indent="0" algn="l" defTabSz="914400" rtl="0" eaLnBrk="0" fontAlgn="base" latinLnBrk="0" hangingPunct="0">
@@ -17124,16 +16939,6 @@
               </a:rPr>
               <a:t>Observation</a:t>
             </a:r>
-            <a:endParaRPr kumimoji="0" lang="en-US" sz="1800" b="1" i="0" u="none" strike="noStrike" cap="none" normalizeH="0" baseline="0" dirty="0" smtClean="0">
-              <a:ln>
-                <a:noFill/>
-              </a:ln>
-              <a:solidFill>
-                <a:schemeClr val="tx1"/>
-              </a:solidFill>
-              <a:effectLst/>
-              <a:latin typeface="Arial" charset="0"/>
-            </a:endParaRPr>
           </a:p>
           <a:p>
             <a:pPr marL="0" marR="0" indent="0" algn="l" defTabSz="914400" rtl="0" eaLnBrk="0" fontAlgn="base" latinLnBrk="0" hangingPunct="0">
@@ -17227,16 +17032,6 @@
               </a:rPr>
               <a:t>Patient</a:t>
             </a:r>
-            <a:endParaRPr kumimoji="0" lang="en-US" sz="1800" b="1" i="0" u="none" strike="noStrike" cap="none" normalizeH="0" baseline="0" dirty="0" smtClean="0">
-              <a:ln>
-                <a:noFill/>
-              </a:ln>
-              <a:solidFill>
-                <a:schemeClr val="tx1"/>
-              </a:solidFill>
-              <a:effectLst/>
-              <a:latin typeface="Arial" charset="0"/>
-            </a:endParaRPr>
           </a:p>
           <a:p>
             <a:pPr marL="0" marR="0" indent="0" algn="l" defTabSz="914400" rtl="0" eaLnBrk="0" fontAlgn="base" latinLnBrk="0" hangingPunct="0">
@@ -17330,16 +17125,6 @@
               </a:rPr>
               <a:t>Organization</a:t>
             </a:r>
-            <a:endParaRPr kumimoji="0" lang="en-US" sz="1800" b="1" i="0" u="none" strike="noStrike" cap="none" normalizeH="0" baseline="0" dirty="0" smtClean="0">
-              <a:ln>
-                <a:noFill/>
-              </a:ln>
-              <a:solidFill>
-                <a:schemeClr val="tx1"/>
-              </a:solidFill>
-              <a:effectLst/>
-              <a:latin typeface="Arial" charset="0"/>
-            </a:endParaRPr>
           </a:p>
           <a:p>
             <a:pPr marL="0" marR="0" indent="0" algn="l" defTabSz="914400" rtl="0" eaLnBrk="0" fontAlgn="base" latinLnBrk="0" hangingPunct="0">
@@ -17433,16 +17218,6 @@
               </a:rPr>
               <a:t>Location</a:t>
             </a:r>
-            <a:endParaRPr kumimoji="0" lang="en-US" sz="1800" b="1" i="0" u="none" strike="noStrike" cap="none" normalizeH="0" baseline="0" dirty="0" smtClean="0">
-              <a:ln>
-                <a:noFill/>
-              </a:ln>
-              <a:solidFill>
-                <a:schemeClr val="tx1"/>
-              </a:solidFill>
-              <a:effectLst/>
-              <a:latin typeface="Arial" charset="0"/>
-            </a:endParaRPr>
           </a:p>
           <a:p>
             <a:pPr marL="0" marR="0" indent="0" algn="l" defTabSz="914400" rtl="0" eaLnBrk="0" fontAlgn="base" latinLnBrk="0" hangingPunct="0">
@@ -17536,16 +17311,6 @@
               </a:rPr>
               <a:t>Practitioner</a:t>
             </a:r>
-            <a:endParaRPr kumimoji="0" lang="en-US" sz="1800" b="1" i="0" u="none" strike="noStrike" cap="none" normalizeH="0" baseline="0" dirty="0" smtClean="0">
-              <a:ln>
-                <a:noFill/>
-              </a:ln>
-              <a:solidFill>
-                <a:schemeClr val="tx1"/>
-              </a:solidFill>
-              <a:effectLst/>
-              <a:latin typeface="Arial" charset="0"/>
-            </a:endParaRPr>
           </a:p>
           <a:p>
             <a:pPr marL="0" marR="0" indent="0" algn="l" defTabSz="914400" rtl="0" eaLnBrk="0" fontAlgn="base" latinLnBrk="0" hangingPunct="0">
@@ -17742,16 +17507,6 @@
               </a:rPr>
               <a:t>Observation</a:t>
             </a:r>
-            <a:endParaRPr kumimoji="0" lang="en-US" sz="1800" b="1" i="0" u="none" strike="noStrike" cap="none" normalizeH="0" baseline="0" dirty="0" smtClean="0">
-              <a:ln>
-                <a:noFill/>
-              </a:ln>
-              <a:solidFill>
-                <a:schemeClr val="tx1"/>
-              </a:solidFill>
-              <a:effectLst/>
-              <a:latin typeface="Arial" charset="0"/>
-            </a:endParaRPr>
           </a:p>
           <a:p>
             <a:pPr marL="0" marR="0" indent="0" algn="l" defTabSz="914400" rtl="0" eaLnBrk="0" fontAlgn="base" latinLnBrk="0" hangingPunct="0">
@@ -17845,16 +17600,6 @@
               </a:rPr>
               <a:t>Observation</a:t>
             </a:r>
-            <a:endParaRPr kumimoji="0" lang="en-US" sz="1800" b="1" i="0" u="none" strike="noStrike" cap="none" normalizeH="0" baseline="0" dirty="0" smtClean="0">
-              <a:ln>
-                <a:noFill/>
-              </a:ln>
-              <a:solidFill>
-                <a:schemeClr val="tx1"/>
-              </a:solidFill>
-              <a:effectLst/>
-              <a:latin typeface="Arial" charset="0"/>
-            </a:endParaRPr>
           </a:p>
           <a:p>
             <a:pPr marL="0" marR="0" indent="0" algn="l" defTabSz="914400" rtl="0" eaLnBrk="0" fontAlgn="base" latinLnBrk="0" hangingPunct="0">
@@ -17948,16 +17693,6 @@
               </a:rPr>
               <a:t>Practitioner</a:t>
             </a:r>
-            <a:endParaRPr kumimoji="0" lang="en-US" sz="1800" b="1" i="0" u="none" strike="noStrike" cap="none" normalizeH="0" baseline="0" dirty="0" smtClean="0">
-              <a:ln>
-                <a:noFill/>
-              </a:ln>
-              <a:solidFill>
-                <a:schemeClr val="tx1"/>
-              </a:solidFill>
-              <a:effectLst/>
-              <a:latin typeface="Arial" charset="0"/>
-            </a:endParaRPr>
           </a:p>
           <a:p>
             <a:pPr marL="0" marR="0" indent="0" algn="l" defTabSz="914400" rtl="0" eaLnBrk="0" fontAlgn="base" latinLnBrk="0" hangingPunct="0">
@@ -18309,16 +18044,6 @@
               </a:rPr>
               <a:t>Device</a:t>
             </a:r>
-            <a:endParaRPr kumimoji="0" lang="en-US" sz="1800" b="1" i="0" u="none" strike="noStrike" cap="none" normalizeH="0" baseline="0" dirty="0" smtClean="0">
-              <a:ln>
-                <a:noFill/>
-              </a:ln>
-              <a:solidFill>
-                <a:schemeClr val="tx1"/>
-              </a:solidFill>
-              <a:effectLst/>
-              <a:latin typeface="Arial" charset="0"/>
-            </a:endParaRPr>
           </a:p>
           <a:p>
             <a:pPr marL="0" marR="0" indent="0" algn="l" defTabSz="914400" rtl="0" eaLnBrk="0" fontAlgn="base" latinLnBrk="0" hangingPunct="0">
@@ -18578,6 +18303,306 @@
               <a:t>4</a:t>
             </a:fld>
             <a:endParaRPr lang="en-CA"/>
+          </a:p>
+        </p:txBody>
+      </p:sp>
+      <p:sp>
+        <p:nvSpPr>
+          <p:cNvPr id="5" name="Content Placeholder 2"/>
+          <p:cNvSpPr txBox="1">
+            <a:spLocks/>
+          </p:cNvSpPr>
+          <p:nvPr/>
+        </p:nvSpPr>
+        <p:spPr bwMode="auto">
+          <a:xfrm>
+            <a:off x="395536" y="1828800"/>
+            <a:ext cx="8382000" cy="4480520"/>
+          </a:xfrm>
+          <a:prstGeom prst="rect">
+            <a:avLst/>
+          </a:prstGeom>
+          <a:noFill/>
+          <a:ln>
+            <a:noFill/>
+          </a:ln>
+          <a:effectLst/>
+          <a:extLst>
+            <a:ext uri="{909E8E84-426E-40DD-AFC4-6F175D3DCCD1}">
+              <a14:hiddenFill xmlns:a14="http://schemas.microsoft.com/office/drawing/2010/main">
+                <a:solidFill>
+                  <a:schemeClr val="accent1"/>
+                </a:solidFill>
+              </a14:hiddenFill>
+            </a:ext>
+            <a:ext uri="{91240B29-F687-4F45-9708-019B960494DF}">
+              <a14:hiddenLine xmlns:a14="http://schemas.microsoft.com/office/drawing/2010/main" w="9525">
+                <a:solidFill>
+                  <a:schemeClr val="tx1"/>
+                </a:solidFill>
+                <a:miter lim="800000"/>
+                <a:headEnd/>
+                <a:tailEnd/>
+              </a14:hiddenLine>
+            </a:ext>
+            <a:ext uri="{AF507438-7753-43E0-B8FC-AC1667EBCBE1}">
+              <a14:hiddenEffects xmlns:a14="http://schemas.microsoft.com/office/drawing/2010/main">
+                <a:effectLst>
+                  <a:outerShdw dist="35921" dir="2700000" algn="ctr" rotWithShape="0">
+                    <a:schemeClr val="bg2"/>
+                  </a:outerShdw>
+                </a:effectLst>
+              </a14:hiddenEffects>
+            </a:ext>
+          </a:extLst>
+        </p:spPr>
+        <p:txBody>
+          <a:bodyPr vert="horz" wrap="square" lIns="91440" tIns="45720" rIns="91440" bIns="45720" numCol="1" anchor="t" anchorCtr="0" compatLnSpc="1">
+            <a:prstTxWarp prst="textNoShape">
+              <a:avLst/>
+            </a:prstTxWarp>
+          </a:bodyPr>
+          <a:lstStyle>
+            <a:lvl1pPr marL="342900" indent="-342900" algn="l" rtl="0" eaLnBrk="1" fontAlgn="base" hangingPunct="1">
+              <a:spcBef>
+                <a:spcPct val="20000"/>
+              </a:spcBef>
+              <a:spcAft>
+                <a:spcPct val="0"/>
+              </a:spcAft>
+              <a:buClr>
+                <a:schemeClr val="accent1"/>
+              </a:buClr>
+              <a:buSzPct val="75000"/>
+              <a:buFont typeface="Wingdings" pitchFamily="2" charset="2"/>
+              <a:buChar char="n"/>
+              <a:defRPr sz="3100">
+                <a:solidFill>
+                  <a:schemeClr val="tx1"/>
+                </a:solidFill>
+                <a:latin typeface="+mn-lt"/>
+                <a:ea typeface="+mn-ea"/>
+                <a:cs typeface="+mn-cs"/>
+              </a:defRPr>
+            </a:lvl1pPr>
+            <a:lvl2pPr marL="742950" indent="-285750" algn="l" rtl="0" eaLnBrk="1" fontAlgn="base" hangingPunct="1">
+              <a:spcBef>
+                <a:spcPct val="20000"/>
+              </a:spcBef>
+              <a:spcAft>
+                <a:spcPct val="0"/>
+              </a:spcAft>
+              <a:buClr>
+                <a:schemeClr val="accent1"/>
+              </a:buClr>
+              <a:buSzPct val="65000"/>
+              <a:buFont typeface="Wingdings" pitchFamily="2" charset="2"/>
+              <a:buChar char="Ø"/>
+              <a:defRPr sz="2600">
+                <a:solidFill>
+                  <a:schemeClr val="tx1"/>
+                </a:solidFill>
+                <a:latin typeface="+mn-lt"/>
+              </a:defRPr>
+            </a:lvl2pPr>
+            <a:lvl3pPr marL="1143000" indent="-228600" algn="l" rtl="0" eaLnBrk="1" fontAlgn="base" hangingPunct="1">
+              <a:spcBef>
+                <a:spcPct val="20000"/>
+              </a:spcBef>
+              <a:spcAft>
+                <a:spcPct val="0"/>
+              </a:spcAft>
+              <a:buClr>
+                <a:schemeClr val="folHlink"/>
+              </a:buClr>
+              <a:buSzPct val="55000"/>
+              <a:buFont typeface="Wingdings" pitchFamily="2" charset="2"/>
+              <a:buChar char="n"/>
+              <a:defRPr sz="2400">
+                <a:solidFill>
+                  <a:schemeClr val="tx1"/>
+                </a:solidFill>
+                <a:latin typeface="+mn-lt"/>
+              </a:defRPr>
+            </a:lvl3pPr>
+            <a:lvl4pPr marL="1600200" indent="-228600" algn="l" rtl="0" eaLnBrk="1" fontAlgn="base" hangingPunct="1">
+              <a:spcBef>
+                <a:spcPct val="20000"/>
+              </a:spcBef>
+              <a:spcAft>
+                <a:spcPct val="0"/>
+              </a:spcAft>
+              <a:buClr>
+                <a:schemeClr val="folHlink"/>
+              </a:buClr>
+              <a:buChar char="•"/>
+              <a:defRPr sz="2000">
+                <a:solidFill>
+                  <a:schemeClr val="tx1"/>
+                </a:solidFill>
+                <a:latin typeface="+mn-lt"/>
+              </a:defRPr>
+            </a:lvl4pPr>
+            <a:lvl5pPr marL="2057400" indent="-228600" algn="l" rtl="0" eaLnBrk="1" fontAlgn="base" hangingPunct="1">
+              <a:spcBef>
+                <a:spcPct val="20000"/>
+              </a:spcBef>
+              <a:spcAft>
+                <a:spcPct val="0"/>
+              </a:spcAft>
+              <a:buClr>
+                <a:schemeClr val="folHlink"/>
+              </a:buClr>
+              <a:buSzPct val="85000"/>
+              <a:buFont typeface="Wingdings" pitchFamily="2" charset="2"/>
+              <a:buChar char="ü"/>
+              <a:defRPr sz="2000">
+                <a:solidFill>
+                  <a:schemeClr val="tx1"/>
+                </a:solidFill>
+                <a:latin typeface="+mn-lt"/>
+              </a:defRPr>
+            </a:lvl5pPr>
+            <a:lvl6pPr marL="2514600" indent="-228600" algn="l" rtl="0" eaLnBrk="1" fontAlgn="base" hangingPunct="1">
+              <a:spcBef>
+                <a:spcPct val="20000"/>
+              </a:spcBef>
+              <a:spcAft>
+                <a:spcPct val="0"/>
+              </a:spcAft>
+              <a:buClr>
+                <a:schemeClr val="folHlink"/>
+              </a:buClr>
+              <a:buSzPct val="85000"/>
+              <a:buFont typeface="Wingdings" pitchFamily="2" charset="2"/>
+              <a:buChar char="ü"/>
+              <a:defRPr sz="2000">
+                <a:solidFill>
+                  <a:schemeClr val="tx1"/>
+                </a:solidFill>
+                <a:latin typeface="+mn-lt"/>
+              </a:defRPr>
+            </a:lvl6pPr>
+            <a:lvl7pPr marL="2971800" indent="-228600" algn="l" rtl="0" eaLnBrk="1" fontAlgn="base" hangingPunct="1">
+              <a:spcBef>
+                <a:spcPct val="20000"/>
+              </a:spcBef>
+              <a:spcAft>
+                <a:spcPct val="0"/>
+              </a:spcAft>
+              <a:buClr>
+                <a:schemeClr val="folHlink"/>
+              </a:buClr>
+              <a:buSzPct val="85000"/>
+              <a:buFont typeface="Wingdings" pitchFamily="2" charset="2"/>
+              <a:buChar char="ü"/>
+              <a:defRPr sz="2000">
+                <a:solidFill>
+                  <a:schemeClr val="tx1"/>
+                </a:solidFill>
+                <a:latin typeface="+mn-lt"/>
+              </a:defRPr>
+            </a:lvl7pPr>
+            <a:lvl8pPr marL="3429000" indent="-228600" algn="l" rtl="0" eaLnBrk="1" fontAlgn="base" hangingPunct="1">
+              <a:spcBef>
+                <a:spcPct val="20000"/>
+              </a:spcBef>
+              <a:spcAft>
+                <a:spcPct val="0"/>
+              </a:spcAft>
+              <a:buClr>
+                <a:schemeClr val="folHlink"/>
+              </a:buClr>
+              <a:buSzPct val="85000"/>
+              <a:buFont typeface="Wingdings" pitchFamily="2" charset="2"/>
+              <a:buChar char="ü"/>
+              <a:defRPr sz="2000">
+                <a:solidFill>
+                  <a:schemeClr val="tx1"/>
+                </a:solidFill>
+                <a:latin typeface="+mn-lt"/>
+              </a:defRPr>
+            </a:lvl8pPr>
+            <a:lvl9pPr marL="3886200" indent="-228600" algn="l" rtl="0" eaLnBrk="1" fontAlgn="base" hangingPunct="1">
+              <a:spcBef>
+                <a:spcPct val="20000"/>
+              </a:spcBef>
+              <a:spcAft>
+                <a:spcPct val="0"/>
+              </a:spcAft>
+              <a:buClr>
+                <a:schemeClr val="folHlink"/>
+              </a:buClr>
+              <a:buSzPct val="85000"/>
+              <a:buFont typeface="Wingdings" pitchFamily="2" charset="2"/>
+              <a:buChar char="ü"/>
+              <a:defRPr sz="2000">
+                <a:solidFill>
+                  <a:schemeClr val="tx1"/>
+                </a:solidFill>
+                <a:latin typeface="+mn-lt"/>
+              </a:defRPr>
+            </a:lvl9pPr>
+          </a:lstStyle>
+          <a:p>
+            <a:r>
+              <a:rPr lang="en-US" kern="0" dirty="0" smtClean="0"/>
+              <a:t>Intro to Profiles</a:t>
+            </a:r>
+          </a:p>
+          <a:p>
+            <a:r>
+              <a:rPr lang="en-US" kern="0" dirty="0" smtClean="0"/>
+              <a:t>Extensions</a:t>
+            </a:r>
+          </a:p>
+          <a:p>
+            <a:r>
+              <a:rPr lang="en-US" kern="0" dirty="0" smtClean="0"/>
+              <a:t>Restrictions</a:t>
+            </a:r>
+          </a:p>
+          <a:p>
+            <a:r>
+              <a:rPr lang="en-US" kern="0" dirty="0" smtClean="0"/>
+              <a:t>Bindings &amp; </a:t>
+            </a:r>
+            <a:r>
+              <a:rPr lang="en-US" kern="0" dirty="0" err="1" smtClean="0"/>
+              <a:t>ValueSets</a:t>
+            </a:r>
+            <a:endParaRPr lang="en-US" kern="0" dirty="0" smtClean="0"/>
+          </a:p>
+          <a:p>
+            <a:r>
+              <a:rPr lang="en-US" kern="0" dirty="0" smtClean="0"/>
+              <a:t>Slicing</a:t>
+            </a:r>
+          </a:p>
+          <a:p>
+            <a:r>
+              <a:rPr lang="en-US" kern="0" dirty="0" smtClean="0"/>
+              <a:t>Aggregation</a:t>
+            </a:r>
+          </a:p>
+          <a:p>
+            <a:r>
+              <a:rPr lang="en-US" kern="0" smtClean="0"/>
+              <a:t>A combined example</a:t>
+            </a:r>
+            <a:endParaRPr lang="en-US" kern="0" dirty="0" smtClean="0"/>
+          </a:p>
+          <a:p>
+            <a:endParaRPr lang="en-US" kern="0" dirty="0" smtClean="0"/>
+          </a:p>
+          <a:p>
+            <a:endParaRPr lang="en-US" kern="0" dirty="0" smtClean="0"/>
+          </a:p>
+          <a:p>
+            <a:endParaRPr lang="en-US" sz="2400" kern="0" dirty="0" smtClean="0"/>
+          </a:p>
+          <a:p>
+            <a:endParaRPr lang="nl-NL" kern="0" dirty="0"/>
           </a:p>
         </p:txBody>
       </p:sp>
@@ -19413,13 +19438,7 @@
               <a:rPr lang="en-US" dirty="0" smtClean="0">
                 <a:latin typeface="Arial" charset="0"/>
               </a:rPr>
-              <a:t>event</a:t>
-            </a:r>
-            <a:r>
-              <a:rPr lang="en-US" dirty="0" smtClean="0">
-                <a:latin typeface="Arial" charset="0"/>
-              </a:rPr>
-              <a:t>: Coding</a:t>
+              <a:t>event: Coding</a:t>
             </a:r>
           </a:p>
           <a:p>
@@ -19445,9 +19464,6 @@
               </a:rPr>
               <a:t>data: Any(0..*) -&gt; List(1..1)</a:t>
             </a:r>
-            <a:endParaRPr lang="en-US" dirty="0" smtClean="0">
-              <a:latin typeface="Arial" charset="0"/>
-            </a:endParaRPr>
           </a:p>
           <a:p>
             <a:pPr marL="0" marR="0" indent="0" algn="l" defTabSz="914400" rtl="0" eaLnBrk="0" fontAlgn="base" latinLnBrk="0" hangingPunct="0">
@@ -19685,9 +19701,6 @@
               </a:rPr>
               <a:t>	(bundled | ref)</a:t>
             </a:r>
-            <a:endParaRPr lang="en-US" dirty="0" smtClean="0">
-              <a:latin typeface="Arial" charset="0"/>
-            </a:endParaRPr>
           </a:p>
           <a:p>
             <a:pPr marL="0" marR="0" indent="0" algn="l" defTabSz="914400" rtl="0" eaLnBrk="0" fontAlgn="base" latinLnBrk="0" hangingPunct="0">
@@ -19826,9 +19839,6 @@
               </a:rPr>
               <a:t>  (bundled)</a:t>
             </a:r>
-            <a:endParaRPr lang="en-US" b="1" dirty="0" smtClean="0">
-              <a:latin typeface="Arial" charset="0"/>
-            </a:endParaRPr>
           </a:p>
         </p:txBody>
       </p:sp>
@@ -19946,9 +19956,6 @@
               </a:rPr>
               <a:t>  (bundled)</a:t>
             </a:r>
-            <a:endParaRPr lang="en-US" b="1" dirty="0" smtClean="0">
-              <a:latin typeface="Arial" charset="0"/>
-            </a:endParaRPr>
           </a:p>
         </p:txBody>
       </p:sp>
@@ -20034,16 +20041,6 @@
               </a:rPr>
               <a:t>-Systolic</a:t>
             </a:r>
-            <a:endParaRPr kumimoji="0" lang="en-US" sz="1800" b="1" i="0" u="sng" strike="noStrike" cap="none" normalizeH="0" baseline="0" dirty="0" smtClean="0">
-              <a:ln>
-                <a:noFill/>
-              </a:ln>
-              <a:solidFill>
-                <a:schemeClr val="tx1"/>
-              </a:solidFill>
-              <a:effectLst/>
-              <a:latin typeface="Arial" charset="0"/>
-            </a:endParaRPr>
           </a:p>
           <a:p>
             <a:pPr marL="0" marR="0" indent="0" algn="l" defTabSz="914400" rtl="0" eaLnBrk="0" fontAlgn="base" latinLnBrk="0" hangingPunct="0">
@@ -20120,13 +20117,7 @@
               <a:rPr lang="en-US" dirty="0" smtClean="0">
                 <a:latin typeface="Arial" charset="0"/>
               </a:rPr>
-              <a:t> </a:t>
-            </a:r>
-            <a:r>
-              <a:rPr lang="en-US" dirty="0" smtClean="0">
-                <a:latin typeface="Arial" charset="0"/>
-              </a:rPr>
-              <a:t>(</a:t>
+              <a:t> (</a:t>
             </a:r>
             <a:r>
               <a:rPr lang="en-US" dirty="0" err="1" smtClean="0">
@@ -20246,16 +20237,6 @@
               </a:rPr>
               <a:t>-Diastolic</a:t>
             </a:r>
-            <a:endParaRPr kumimoji="0" lang="en-US" sz="1800" b="1" i="0" u="sng" strike="noStrike" cap="none" normalizeH="0" baseline="0" dirty="0" smtClean="0">
-              <a:ln>
-                <a:noFill/>
-              </a:ln>
-              <a:solidFill>
-                <a:schemeClr val="tx1"/>
-              </a:solidFill>
-              <a:effectLst/>
-              <a:latin typeface="Arial" charset="0"/>
-            </a:endParaRPr>
           </a:p>
           <a:p>
             <a:pPr marL="0" marR="0" indent="0" algn="l" defTabSz="914400" rtl="0" eaLnBrk="0" fontAlgn="base" latinLnBrk="0" hangingPunct="0">
@@ -20332,13 +20313,7 @@
               <a:rPr lang="en-US" dirty="0" smtClean="0">
                 <a:latin typeface="Arial" charset="0"/>
               </a:rPr>
-              <a:t> </a:t>
-            </a:r>
-            <a:r>
-              <a:rPr lang="en-US" dirty="0" smtClean="0">
-                <a:latin typeface="Arial" charset="0"/>
-              </a:rPr>
-              <a:t>(</a:t>
+              <a:t> (</a:t>
             </a:r>
             <a:r>
               <a:rPr lang="en-US" dirty="0" err="1" smtClean="0">

</xml_diff>